<commit_message>
Revisions on final Project
</commit_message>
<xml_diff>
--- a/Capstone2-CCI30Index/Reports/Capstone Final Project Slides.pptx
+++ b/Capstone2-CCI30Index/Reports/Capstone Final Project Slides.pptx
@@ -10,13 +10,14 @@
     <p:sldId id="280" r:id="rId4"/>
     <p:sldId id="266" r:id="rId5"/>
     <p:sldId id="281" r:id="rId6"/>
-    <p:sldId id="267" r:id="rId7"/>
-    <p:sldId id="282" r:id="rId8"/>
-    <p:sldId id="283" r:id="rId9"/>
-    <p:sldId id="275" r:id="rId10"/>
-    <p:sldId id="284" r:id="rId11"/>
-    <p:sldId id="276" r:id="rId12"/>
-    <p:sldId id="277" r:id="rId13"/>
+    <p:sldId id="285" r:id="rId7"/>
+    <p:sldId id="267" r:id="rId8"/>
+    <p:sldId id="282" r:id="rId9"/>
+    <p:sldId id="283" r:id="rId10"/>
+    <p:sldId id="275" r:id="rId11"/>
+    <p:sldId id="284" r:id="rId12"/>
+    <p:sldId id="276" r:id="rId13"/>
+    <p:sldId id="277" r:id="rId14"/>
   </p:sldIdLst>
   <p:sldSz cx="12192000" cy="6858000"/>
   <p:notesSz cx="6858000" cy="9144000"/>
@@ -115,13 +116,18 @@
       </a:defRPr>
     </a:lvl9pPr>
   </p:defaultTextStyle>
+  <p:extLst>
+    <p:ext uri="{EFAFB233-063F-42B5-8137-9DF3F51BA10A}">
+      <p15:sldGuideLst xmlns:p15="http://schemas.microsoft.com/office/powerpoint/2012/main"/>
+    </p:ext>
+  </p:extLst>
 </p:presentation>
 </file>
 
 <file path=ppt/revisionInfo.xml><?xml version="1.0" encoding="utf-8"?>
 <p1510:revInfo xmlns:a="http://schemas.openxmlformats.org/drawingml/2006/main" xmlns:r="http://schemas.openxmlformats.org/officeDocument/2006/relationships" xmlns:p1510="http://schemas.microsoft.com/office/powerpoint/2015/10/main">
   <p1510:revLst>
-    <p1510:client id="{1B2367C7-E24E-4297-81FB-3B1817A37E96}" v="26" dt="2021-09-02T20:20:23.948"/>
+    <p1510:client id="{1B2367C7-E24E-4297-81FB-3B1817A37E96}" v="32" dt="2021-09-09T21:27:45.332"/>
   </p1510:revLst>
 </p1510:revInfo>
 </file>
@@ -131,12 +137,12 @@
   <pc:docChgLst>
     <pc:chgData name="Kenney Kwan" userId="7e8312c5ae1ba077" providerId="LiveId" clId="{1B2367C7-E24E-4297-81FB-3B1817A37E96}"/>
     <pc:docChg chg="undo custSel addSld modSld sldOrd">
-      <pc:chgData name="Kenney Kwan" userId="7e8312c5ae1ba077" providerId="LiveId" clId="{1B2367C7-E24E-4297-81FB-3B1817A37E96}" dt="2021-09-02T20:22:41.537" v="786" actId="5793"/>
+      <pc:chgData name="Kenney Kwan" userId="7e8312c5ae1ba077" providerId="LiveId" clId="{1B2367C7-E24E-4297-81FB-3B1817A37E96}" dt="2021-09-09T21:38:37.758" v="1236" actId="20577"/>
       <pc:docMkLst>
         <pc:docMk/>
       </pc:docMkLst>
       <pc:sldChg chg="addSp delSp modSp mod ord">
-        <pc:chgData name="Kenney Kwan" userId="7e8312c5ae1ba077" providerId="LiveId" clId="{1B2367C7-E24E-4297-81FB-3B1817A37E96}" dt="2021-09-02T20:22:41.537" v="786" actId="5793"/>
+        <pc:chgData name="Kenney Kwan" userId="7e8312c5ae1ba077" providerId="LiveId" clId="{1B2367C7-E24E-4297-81FB-3B1817A37E96}" dt="2021-09-09T21:38:37.758" v="1236" actId="20577"/>
         <pc:sldMkLst>
           <pc:docMk/>
           <pc:sldMk cId="4224861659" sldId="267"/>
@@ -158,7 +164,7 @@
           </ac:spMkLst>
         </pc:spChg>
         <pc:spChg chg="add mod">
-          <ac:chgData name="Kenney Kwan" userId="7e8312c5ae1ba077" providerId="LiveId" clId="{1B2367C7-E24E-4297-81FB-3B1817A37E96}" dt="2021-09-02T20:22:41.537" v="786" actId="5793"/>
+          <ac:chgData name="Kenney Kwan" userId="7e8312c5ae1ba077" providerId="LiveId" clId="{1B2367C7-E24E-4297-81FB-3B1817A37E96}" dt="2021-09-09T21:38:37.758" v="1236" actId="20577"/>
           <ac:spMkLst>
             <pc:docMk/>
             <pc:sldMk cId="4224861659" sldId="267"/>
@@ -253,12 +259,20 @@
             <ac:picMk id="13" creationId="{1ED2964F-42B4-4A4E-87EA-2E68318C4A9A}"/>
           </ac:picMkLst>
         </pc:picChg>
-        <pc:picChg chg="add mod">
-          <ac:chgData name="Kenney Kwan" userId="7e8312c5ae1ba077" providerId="LiveId" clId="{1B2367C7-E24E-4297-81FB-3B1817A37E96}" dt="2021-09-02T19:17:40.876" v="105" actId="1076"/>
+        <pc:picChg chg="add del mod">
+          <ac:chgData name="Kenney Kwan" userId="7e8312c5ae1ba077" providerId="LiveId" clId="{1B2367C7-E24E-4297-81FB-3B1817A37E96}" dt="2021-09-09T21:27:26.780" v="867" actId="478"/>
           <ac:picMkLst>
             <pc:docMk/>
             <pc:sldMk cId="4224861659" sldId="267"/>
             <ac:picMk id="24" creationId="{E93A3A11-2569-4142-BA63-02B59D063E97}"/>
+          </ac:picMkLst>
+        </pc:picChg>
+        <pc:picChg chg="add mod">
+          <ac:chgData name="Kenney Kwan" userId="7e8312c5ae1ba077" providerId="LiveId" clId="{1B2367C7-E24E-4297-81FB-3B1817A37E96}" dt="2021-09-09T21:27:45.332" v="873" actId="14100"/>
+          <ac:picMkLst>
+            <pc:docMk/>
+            <pc:sldMk cId="4224861659" sldId="267"/>
+            <ac:picMk id="1026" creationId="{8356BC23-9BD2-410D-906A-58F9DBD4A66F}"/>
           </ac:picMkLst>
         </pc:picChg>
       </pc:sldChg>
@@ -284,6 +298,21 @@
             <ac:picMk id="1028" creationId="{3D2A3FB6-7837-4793-AA52-9087F6A3F2DA}"/>
           </ac:picMkLst>
         </pc:picChg>
+      </pc:sldChg>
+      <pc:sldChg chg="modSp mod">
+        <pc:chgData name="Kenney Kwan" userId="7e8312c5ae1ba077" providerId="LiveId" clId="{1B2367C7-E24E-4297-81FB-3B1817A37E96}" dt="2021-09-09T20:30:30.503" v="798" actId="5793"/>
+        <pc:sldMkLst>
+          <pc:docMk/>
+          <pc:sldMk cId="1070382493" sldId="280"/>
+        </pc:sldMkLst>
+        <pc:spChg chg="mod">
+          <ac:chgData name="Kenney Kwan" userId="7e8312c5ae1ba077" providerId="LiveId" clId="{1B2367C7-E24E-4297-81FB-3B1817A37E96}" dt="2021-09-09T20:30:30.503" v="798" actId="5793"/>
+          <ac:spMkLst>
+            <pc:docMk/>
+            <pc:sldMk cId="1070382493" sldId="280"/>
+            <ac:spMk id="3" creationId="{FAFF643D-4422-4871-812A-0AFFE03F5CAE}"/>
+          </ac:spMkLst>
+        </pc:spChg>
       </pc:sldChg>
       <pc:sldChg chg="addSp modSp mod">
         <pc:chgData name="Kenney Kwan" userId="7e8312c5ae1ba077" providerId="LiveId" clId="{1B2367C7-E24E-4297-81FB-3B1817A37E96}" dt="2021-09-02T20:22:23.551" v="780" actId="20577"/>
@@ -393,6 +422,21 @@
           </ac:picMkLst>
         </pc:picChg>
       </pc:sldChg>
+      <pc:sldChg chg="modSp add mod">
+        <pc:chgData name="Kenney Kwan" userId="7e8312c5ae1ba077" providerId="LiveId" clId="{1B2367C7-E24E-4297-81FB-3B1817A37E96}" dt="2021-09-09T21:27:12.272" v="801" actId="20577"/>
+        <pc:sldMkLst>
+          <pc:docMk/>
+          <pc:sldMk cId="3708589165" sldId="285"/>
+        </pc:sldMkLst>
+        <pc:spChg chg="mod">
+          <ac:chgData name="Kenney Kwan" userId="7e8312c5ae1ba077" providerId="LiveId" clId="{1B2367C7-E24E-4297-81FB-3B1817A37E96}" dt="2021-09-09T21:27:12.272" v="801" actId="20577"/>
+          <ac:spMkLst>
+            <pc:docMk/>
+            <pc:sldMk cId="3708589165" sldId="285"/>
+            <ac:spMk id="7" creationId="{E7F461C1-6A4F-4007-A094-F631347E2400}"/>
+          </ac:spMkLst>
+        </pc:spChg>
+      </pc:sldChg>
     </pc:docChg>
   </pc:docChgLst>
 </pc:chgInfo>
@@ -545,7 +589,7 @@
           <a:p>
             <a:fld id="{AC4FA24E-0CF1-44DE-8AEF-09262B2AAA1F}" type="datetimeFigureOut">
               <a:rPr lang="en-US" smtClean="0"/>
-              <a:t>9/2/2021</a:t>
+              <a:t>9/9/2021</a:t>
             </a:fld>
             <a:endParaRPr lang="en-US"/>
           </a:p>
@@ -743,7 +787,7 @@
           <a:p>
             <a:fld id="{AC4FA24E-0CF1-44DE-8AEF-09262B2AAA1F}" type="datetimeFigureOut">
               <a:rPr lang="en-US" smtClean="0"/>
-              <a:t>9/2/2021</a:t>
+              <a:t>9/9/2021</a:t>
             </a:fld>
             <a:endParaRPr lang="en-US"/>
           </a:p>
@@ -951,7 +995,7 @@
           <a:p>
             <a:fld id="{AC4FA24E-0CF1-44DE-8AEF-09262B2AAA1F}" type="datetimeFigureOut">
               <a:rPr lang="en-US" smtClean="0"/>
-              <a:t>9/2/2021</a:t>
+              <a:t>9/9/2021</a:t>
             </a:fld>
             <a:endParaRPr lang="en-US"/>
           </a:p>
@@ -1149,7 +1193,7 @@
           <a:p>
             <a:fld id="{AC4FA24E-0CF1-44DE-8AEF-09262B2AAA1F}" type="datetimeFigureOut">
               <a:rPr lang="en-US" smtClean="0"/>
-              <a:t>9/2/2021</a:t>
+              <a:t>9/9/2021</a:t>
             </a:fld>
             <a:endParaRPr lang="en-US"/>
           </a:p>
@@ -1424,7 +1468,7 @@
           <a:p>
             <a:fld id="{AC4FA24E-0CF1-44DE-8AEF-09262B2AAA1F}" type="datetimeFigureOut">
               <a:rPr lang="en-US" smtClean="0"/>
-              <a:t>9/2/2021</a:t>
+              <a:t>9/9/2021</a:t>
             </a:fld>
             <a:endParaRPr lang="en-US"/>
           </a:p>
@@ -1689,7 +1733,7 @@
           <a:p>
             <a:fld id="{AC4FA24E-0CF1-44DE-8AEF-09262B2AAA1F}" type="datetimeFigureOut">
               <a:rPr lang="en-US" smtClean="0"/>
-              <a:t>9/2/2021</a:t>
+              <a:t>9/9/2021</a:t>
             </a:fld>
             <a:endParaRPr lang="en-US"/>
           </a:p>
@@ -2101,7 +2145,7 @@
           <a:p>
             <a:fld id="{AC4FA24E-0CF1-44DE-8AEF-09262B2AAA1F}" type="datetimeFigureOut">
               <a:rPr lang="en-US" smtClean="0"/>
-              <a:t>9/2/2021</a:t>
+              <a:t>9/9/2021</a:t>
             </a:fld>
             <a:endParaRPr lang="en-US"/>
           </a:p>
@@ -2242,7 +2286,7 @@
           <a:p>
             <a:fld id="{AC4FA24E-0CF1-44DE-8AEF-09262B2AAA1F}" type="datetimeFigureOut">
               <a:rPr lang="en-US" smtClean="0"/>
-              <a:t>9/2/2021</a:t>
+              <a:t>9/9/2021</a:t>
             </a:fld>
             <a:endParaRPr lang="en-US"/>
           </a:p>
@@ -2355,7 +2399,7 @@
           <a:p>
             <a:fld id="{AC4FA24E-0CF1-44DE-8AEF-09262B2AAA1F}" type="datetimeFigureOut">
               <a:rPr lang="en-US" smtClean="0"/>
-              <a:t>9/2/2021</a:t>
+              <a:t>9/9/2021</a:t>
             </a:fld>
             <a:endParaRPr lang="en-US"/>
           </a:p>
@@ -2666,7 +2710,7 @@
           <a:p>
             <a:fld id="{AC4FA24E-0CF1-44DE-8AEF-09262B2AAA1F}" type="datetimeFigureOut">
               <a:rPr lang="en-US" smtClean="0"/>
-              <a:t>9/2/2021</a:t>
+              <a:t>9/9/2021</a:t>
             </a:fld>
             <a:endParaRPr lang="en-US"/>
           </a:p>
@@ -2954,7 +2998,7 @@
           <a:p>
             <a:fld id="{AC4FA24E-0CF1-44DE-8AEF-09262B2AAA1F}" type="datetimeFigureOut">
               <a:rPr lang="en-US" smtClean="0"/>
-              <a:t>9/2/2021</a:t>
+              <a:t>9/9/2021</a:t>
             </a:fld>
             <a:endParaRPr lang="en-US"/>
           </a:p>
@@ -3195,7 +3239,7 @@
           <a:p>
             <a:fld id="{AC4FA24E-0CF1-44DE-8AEF-09262B2AAA1F}" type="datetimeFigureOut">
               <a:rPr lang="en-US" smtClean="0"/>
-              <a:t>9/2/2021</a:t>
+              <a:t>9/9/2021</a:t>
             </a:fld>
             <a:endParaRPr lang="en-US"/>
           </a:p>
@@ -4247,8 +4291,8 @@
         </p:nvSpPr>
         <p:spPr>
           <a:xfrm>
-            <a:off x="924450" y="1885279"/>
-            <a:ext cx="4174178" cy="4671491"/>
+            <a:off x="1371599" y="1891970"/>
+            <a:ext cx="9724031" cy="4671491"/>
           </a:xfrm>
         </p:spPr>
         <p:txBody>
@@ -4257,162 +4301,22 @@
           </a:bodyPr>
           <a:lstStyle/>
           <a:p>
-            <a:pPr>
-              <a:lnSpc>
-                <a:spcPct val="107000"/>
-              </a:lnSpc>
-              <a:spcBef>
-                <a:spcPts val="0"/>
-              </a:spcBef>
-              <a:spcAft>
-                <a:spcPts val="800"/>
-              </a:spcAft>
-            </a:pPr>
-            <a:r>
-              <a:rPr lang="en-US" sz="2200" dirty="0">
-                <a:effectLst/>
-                <a:latin typeface="Calibri" panose="020F0502020204030204" pitchFamily="34" charset="0"/>
-                <a:ea typeface="Calibri" panose="020F0502020204030204" pitchFamily="34" charset="0"/>
-                <a:cs typeface="Times New Roman" panose="02020603050405020304" pitchFamily="18" charset="0"/>
-              </a:rPr>
-              <a:t>Random Forest Regression was the best performing model in R squared, and on MSE</a:t>
-            </a:r>
-          </a:p>
-          <a:p>
-            <a:pPr>
-              <a:lnSpc>
-                <a:spcPct val="107000"/>
-              </a:lnSpc>
-              <a:spcBef>
-                <a:spcPts val="0"/>
-              </a:spcBef>
-              <a:spcAft>
-                <a:spcPts val="800"/>
-              </a:spcAft>
-            </a:pPr>
-            <a:r>
-              <a:rPr lang="en-US" sz="2200" dirty="0">
-                <a:effectLst/>
-                <a:latin typeface="Calibri" panose="020F0502020204030204" pitchFamily="34" charset="0"/>
-                <a:ea typeface="Calibri" panose="020F0502020204030204" pitchFamily="34" charset="0"/>
-                <a:cs typeface="Times New Roman" panose="02020603050405020304" pitchFamily="18" charset="0"/>
-              </a:rPr>
-              <a:t>R Squared had an average score of </a:t>
-            </a:r>
-            <a:r>
-              <a:rPr lang="en-US" sz="2200" b="1" dirty="0">
-                <a:effectLst/>
-                <a:latin typeface="Calibri" panose="020F0502020204030204" pitchFamily="34" charset="0"/>
-                <a:ea typeface="Calibri" panose="020F0502020204030204" pitchFamily="34" charset="0"/>
-                <a:cs typeface="Times New Roman" panose="02020603050405020304" pitchFamily="18" charset="0"/>
-              </a:rPr>
-              <a:t>0.46</a:t>
-            </a:r>
-            <a:r>
-              <a:rPr lang="en-US" sz="2200" dirty="0">
-                <a:effectLst/>
-                <a:latin typeface="Calibri" panose="020F0502020204030204" pitchFamily="34" charset="0"/>
-                <a:ea typeface="Calibri" panose="020F0502020204030204" pitchFamily="34" charset="0"/>
-                <a:cs typeface="Times New Roman" panose="02020603050405020304" pitchFamily="18" charset="0"/>
-              </a:rPr>
-              <a:t> </a:t>
-            </a:r>
-            <a:r>
-              <a:rPr lang="en-US" sz="2200" dirty="0">
-                <a:latin typeface="Calibri" panose="020F0502020204030204" pitchFamily="34" charset="0"/>
-                <a:ea typeface="Calibri" panose="020F0502020204030204" pitchFamily="34" charset="0"/>
-                <a:cs typeface="Times New Roman" panose="02020603050405020304" pitchFamily="18" charset="0"/>
-              </a:rPr>
-              <a:t>across </a:t>
-            </a:r>
-            <a:r>
-              <a:rPr lang="en-US" sz="2200" dirty="0">
-                <a:effectLst/>
-                <a:latin typeface="Calibri" panose="020F0502020204030204" pitchFamily="34" charset="0"/>
-                <a:ea typeface="Calibri" panose="020F0502020204030204" pitchFamily="34" charset="0"/>
-                <a:cs typeface="Times New Roman" panose="02020603050405020304" pitchFamily="18" charset="0"/>
-              </a:rPr>
-              <a:t>cross validation splits with a mean MSE of the training data of </a:t>
-            </a:r>
-            <a:r>
-              <a:rPr lang="en-US" sz="2200" b="1" dirty="0">
-                <a:effectLst/>
-                <a:latin typeface="Calibri" panose="020F0502020204030204" pitchFamily="34" charset="0"/>
-                <a:ea typeface="Calibri" panose="020F0502020204030204" pitchFamily="34" charset="0"/>
-                <a:cs typeface="Times New Roman" panose="02020603050405020304" pitchFamily="18" charset="0"/>
-              </a:rPr>
-              <a:t>0.095</a:t>
-            </a:r>
-            <a:r>
-              <a:rPr lang="en-US" sz="2200" dirty="0">
-                <a:effectLst/>
-                <a:latin typeface="Calibri" panose="020F0502020204030204" pitchFamily="34" charset="0"/>
-                <a:ea typeface="Calibri" panose="020F0502020204030204" pitchFamily="34" charset="0"/>
-                <a:cs typeface="Times New Roman" panose="02020603050405020304" pitchFamily="18" charset="0"/>
-              </a:rPr>
-              <a:t> and a mean of the test MSE of </a:t>
-            </a:r>
-            <a:r>
-              <a:rPr lang="en-US" sz="2200" b="1" dirty="0">
-                <a:effectLst/>
-                <a:latin typeface="Calibri" panose="020F0502020204030204" pitchFamily="34" charset="0"/>
-                <a:ea typeface="Calibri" panose="020F0502020204030204" pitchFamily="34" charset="0"/>
-                <a:cs typeface="Times New Roman" panose="02020603050405020304" pitchFamily="18" charset="0"/>
-              </a:rPr>
-              <a:t>1.19</a:t>
-            </a:r>
-            <a:r>
-              <a:rPr lang="en-US" sz="2200" dirty="0">
-                <a:effectLst/>
-                <a:latin typeface="Calibri" panose="020F0502020204030204" pitchFamily="34" charset="0"/>
-                <a:ea typeface="Calibri" panose="020F0502020204030204" pitchFamily="34" charset="0"/>
-                <a:cs typeface="Times New Roman" panose="02020603050405020304" pitchFamily="18" charset="0"/>
-              </a:rPr>
-              <a:t>. </a:t>
-            </a:r>
-            <a:endParaRPr lang="en-US" sz="2200" dirty="0">
-              <a:latin typeface="Calibri" panose="020F0502020204030204" pitchFamily="34" charset="0"/>
-              <a:ea typeface="Calibri" panose="020F0502020204030204" pitchFamily="34" charset="0"/>
-              <a:cs typeface="Times New Roman" panose="02020603050405020304" pitchFamily="18" charset="0"/>
-            </a:endParaRPr>
-          </a:p>
-          <a:p>
-            <a:pPr>
-              <a:lnSpc>
-                <a:spcPct val="107000"/>
-              </a:lnSpc>
-              <a:spcBef>
-                <a:spcPts val="0"/>
-              </a:spcBef>
-              <a:spcAft>
-                <a:spcPts val="800"/>
-              </a:spcAft>
-            </a:pPr>
-            <a:r>
-              <a:rPr lang="en-US" sz="2200" dirty="0">
-                <a:effectLst/>
-                <a:latin typeface="Calibri" panose="020F0502020204030204" pitchFamily="34" charset="0"/>
-                <a:ea typeface="Calibri" panose="020F0502020204030204" pitchFamily="34" charset="0"/>
-                <a:cs typeface="Times New Roman" panose="02020603050405020304" pitchFamily="18" charset="0"/>
-              </a:rPr>
-              <a:t>Bitcoin google searches has the biggest impact out of all the independent variables. </a:t>
-            </a:r>
-          </a:p>
-          <a:p>
             <a:endParaRPr lang="en-US" sz="2000" dirty="0"/>
           </a:p>
         </p:txBody>
       </p:sp>
       <p:pic>
         <p:nvPicPr>
-          <p:cNvPr id="9" name="Picture 8" descr="Chart&#10;&#10;Description automatically generated">
-            <a:extLst>
-              <a:ext uri="{FF2B5EF4-FFF2-40B4-BE49-F238E27FC236}">
-                <a16:creationId xmlns:a16="http://schemas.microsoft.com/office/drawing/2014/main" id="{EE4C38BC-1EB0-44E5-AA4C-EE0EBC9BAC31}"/>
-              </a:ext>
-            </a:extLst>
-          </p:cNvPr>
-          <p:cNvPicPr/>
+          <p:cNvPr id="1026" name="Picture 2">
+            <a:extLst>
+              <a:ext uri="{FF2B5EF4-FFF2-40B4-BE49-F238E27FC236}">
+                <a16:creationId xmlns:a16="http://schemas.microsoft.com/office/drawing/2014/main" id="{1AFD1DF8-0A51-4E12-9755-030C1D89B2FB}"/>
+              </a:ext>
+            </a:extLst>
+          </p:cNvPr>
+          <p:cNvPicPr>
+            <a:picLocks noChangeAspect="1" noChangeArrowheads="1"/>
+          </p:cNvPicPr>
           <p:nvPr/>
         </p:nvPicPr>
         <p:blipFill>
@@ -4430,22 +4334,75 @@
         </p:blipFill>
         <p:spPr bwMode="auto">
           <a:xfrm>
-            <a:off x="5795158" y="1891969"/>
-            <a:ext cx="6163294" cy="4200073"/>
+            <a:off x="189269" y="1791286"/>
+            <a:ext cx="6044345" cy="4449833"/>
           </a:xfrm>
           <a:prstGeom prst="rect">
             <a:avLst/>
           </a:prstGeom>
           <a:noFill/>
-          <a:ln>
-            <a:noFill/>
-          </a:ln>
+          <a:extLst>
+            <a:ext uri="{909E8E84-426E-40DD-AFC4-6F175D3DCCD1}">
+              <a14:hiddenFill xmlns:a14="http://schemas.microsoft.com/office/drawing/2010/main">
+                <a:solidFill>
+                  <a:srgbClr val="FFFFFF"/>
+                </a:solidFill>
+              </a14:hiddenFill>
+            </a:ext>
+          </a:extLst>
+        </p:spPr>
+      </p:pic>
+      <p:pic>
+        <p:nvPicPr>
+          <p:cNvPr id="1028" name="Picture 4">
+            <a:extLst>
+              <a:ext uri="{FF2B5EF4-FFF2-40B4-BE49-F238E27FC236}">
+                <a16:creationId xmlns:a16="http://schemas.microsoft.com/office/drawing/2014/main" id="{3D2A3FB6-7837-4793-AA52-9087F6A3F2DA}"/>
+              </a:ext>
+            </a:extLst>
+          </p:cNvPr>
+          <p:cNvPicPr>
+            <a:picLocks noChangeAspect="1" noChangeArrowheads="1"/>
+          </p:cNvPicPr>
+          <p:nvPr/>
+        </p:nvPicPr>
+        <p:blipFill>
+          <a:blip r:embed="rId3">
+            <a:extLst>
+              <a:ext uri="{28A0092B-C50C-407E-A947-70E740481C1C}">
+                <a14:useLocalDpi xmlns:a14="http://schemas.microsoft.com/office/drawing/2010/main" val="0"/>
+              </a:ext>
+            </a:extLst>
+          </a:blip>
+          <a:srcRect/>
+          <a:stretch>
+            <a:fillRect/>
+          </a:stretch>
+        </p:blipFill>
+        <p:spPr bwMode="auto">
+          <a:xfrm>
+            <a:off x="6319574" y="1815102"/>
+            <a:ext cx="5777392" cy="4430640"/>
+          </a:xfrm>
+          <a:prstGeom prst="rect">
+            <a:avLst/>
+          </a:prstGeom>
+          <a:noFill/>
+          <a:extLst>
+            <a:ext uri="{909E8E84-426E-40DD-AFC4-6F175D3DCCD1}">
+              <a14:hiddenFill xmlns:a14="http://schemas.microsoft.com/office/drawing/2010/main">
+                <a:solidFill>
+                  <a:srgbClr val="FFFFFF"/>
+                </a:solidFill>
+              </a14:hiddenFill>
+            </a:ext>
+          </a:extLst>
         </p:spPr>
       </p:pic>
     </p:spTree>
     <p:extLst>
       <p:ext uri="{BB962C8B-B14F-4D97-AF65-F5344CB8AC3E}">
-        <p14:creationId xmlns:p14="http://schemas.microsoft.com/office/powerpoint/2010/main" val="2783444231"/>
+        <p14:creationId xmlns:p14="http://schemas.microsoft.com/office/powerpoint/2010/main" val="2362474329"/>
       </p:ext>
     </p:extLst>
   </p:cSld>
@@ -4890,6 +4847,672 @@
                   <a:srgbClr val="FFFFFF"/>
                 </a:solidFill>
               </a:rPr>
+              <a:t>Model</a:t>
+            </a:r>
+          </a:p>
+        </p:txBody>
+      </p:sp>
+      <p:sp>
+        <p:nvSpPr>
+          <p:cNvPr id="3" name="Content Placeholder 2">
+            <a:extLst>
+              <a:ext uri="{FF2B5EF4-FFF2-40B4-BE49-F238E27FC236}">
+                <a16:creationId xmlns:a16="http://schemas.microsoft.com/office/drawing/2014/main" id="{FAFF643D-4422-4871-812A-0AFFE03F5CAE}"/>
+              </a:ext>
+            </a:extLst>
+          </p:cNvPr>
+          <p:cNvSpPr>
+            <a:spLocks noGrp="1"/>
+          </p:cNvSpPr>
+          <p:nvPr>
+            <p:ph idx="1"/>
+          </p:nvPr>
+        </p:nvSpPr>
+        <p:spPr>
+          <a:xfrm>
+            <a:off x="924450" y="1885279"/>
+            <a:ext cx="4174178" cy="4671491"/>
+          </a:xfrm>
+        </p:spPr>
+        <p:txBody>
+          <a:bodyPr anchor="ctr">
+            <a:normAutofit/>
+          </a:bodyPr>
+          <a:lstStyle/>
+          <a:p>
+            <a:pPr>
+              <a:lnSpc>
+                <a:spcPct val="107000"/>
+              </a:lnSpc>
+              <a:spcBef>
+                <a:spcPts val="0"/>
+              </a:spcBef>
+              <a:spcAft>
+                <a:spcPts val="800"/>
+              </a:spcAft>
+            </a:pPr>
+            <a:r>
+              <a:rPr lang="en-US" sz="2200" dirty="0">
+                <a:effectLst/>
+                <a:latin typeface="Calibri" panose="020F0502020204030204" pitchFamily="34" charset="0"/>
+                <a:ea typeface="Calibri" panose="020F0502020204030204" pitchFamily="34" charset="0"/>
+                <a:cs typeface="Times New Roman" panose="02020603050405020304" pitchFamily="18" charset="0"/>
+              </a:rPr>
+              <a:t>Random Forest Regression was the best performing model in R squared, and on MSE</a:t>
+            </a:r>
+          </a:p>
+          <a:p>
+            <a:pPr>
+              <a:lnSpc>
+                <a:spcPct val="107000"/>
+              </a:lnSpc>
+              <a:spcBef>
+                <a:spcPts val="0"/>
+              </a:spcBef>
+              <a:spcAft>
+                <a:spcPts val="800"/>
+              </a:spcAft>
+            </a:pPr>
+            <a:r>
+              <a:rPr lang="en-US" sz="2200" dirty="0">
+                <a:effectLst/>
+                <a:latin typeface="Calibri" panose="020F0502020204030204" pitchFamily="34" charset="0"/>
+                <a:ea typeface="Calibri" panose="020F0502020204030204" pitchFamily="34" charset="0"/>
+                <a:cs typeface="Times New Roman" panose="02020603050405020304" pitchFamily="18" charset="0"/>
+              </a:rPr>
+              <a:t>R Squared had an average score of </a:t>
+            </a:r>
+            <a:r>
+              <a:rPr lang="en-US" sz="2200" b="1" dirty="0">
+                <a:effectLst/>
+                <a:latin typeface="Calibri" panose="020F0502020204030204" pitchFamily="34" charset="0"/>
+                <a:ea typeface="Calibri" panose="020F0502020204030204" pitchFamily="34" charset="0"/>
+                <a:cs typeface="Times New Roman" panose="02020603050405020304" pitchFamily="18" charset="0"/>
+              </a:rPr>
+              <a:t>0.46</a:t>
+            </a:r>
+            <a:r>
+              <a:rPr lang="en-US" sz="2200" dirty="0">
+                <a:effectLst/>
+                <a:latin typeface="Calibri" panose="020F0502020204030204" pitchFamily="34" charset="0"/>
+                <a:ea typeface="Calibri" panose="020F0502020204030204" pitchFamily="34" charset="0"/>
+                <a:cs typeface="Times New Roman" panose="02020603050405020304" pitchFamily="18" charset="0"/>
+              </a:rPr>
+              <a:t> </a:t>
+            </a:r>
+            <a:r>
+              <a:rPr lang="en-US" sz="2200" dirty="0">
+                <a:latin typeface="Calibri" panose="020F0502020204030204" pitchFamily="34" charset="0"/>
+                <a:ea typeface="Calibri" panose="020F0502020204030204" pitchFamily="34" charset="0"/>
+                <a:cs typeface="Times New Roman" panose="02020603050405020304" pitchFamily="18" charset="0"/>
+              </a:rPr>
+              <a:t>across </a:t>
+            </a:r>
+            <a:r>
+              <a:rPr lang="en-US" sz="2200" dirty="0">
+                <a:effectLst/>
+                <a:latin typeface="Calibri" panose="020F0502020204030204" pitchFamily="34" charset="0"/>
+                <a:ea typeface="Calibri" panose="020F0502020204030204" pitchFamily="34" charset="0"/>
+                <a:cs typeface="Times New Roman" panose="02020603050405020304" pitchFamily="18" charset="0"/>
+              </a:rPr>
+              <a:t>cross validation splits with a mean MSE of the training data of </a:t>
+            </a:r>
+            <a:r>
+              <a:rPr lang="en-US" sz="2200" b="1" dirty="0">
+                <a:effectLst/>
+                <a:latin typeface="Calibri" panose="020F0502020204030204" pitchFamily="34" charset="0"/>
+                <a:ea typeface="Calibri" panose="020F0502020204030204" pitchFamily="34" charset="0"/>
+                <a:cs typeface="Times New Roman" panose="02020603050405020304" pitchFamily="18" charset="0"/>
+              </a:rPr>
+              <a:t>0.095</a:t>
+            </a:r>
+            <a:r>
+              <a:rPr lang="en-US" sz="2200" dirty="0">
+                <a:effectLst/>
+                <a:latin typeface="Calibri" panose="020F0502020204030204" pitchFamily="34" charset="0"/>
+                <a:ea typeface="Calibri" panose="020F0502020204030204" pitchFamily="34" charset="0"/>
+                <a:cs typeface="Times New Roman" panose="02020603050405020304" pitchFamily="18" charset="0"/>
+              </a:rPr>
+              <a:t> and a mean of the test MSE of </a:t>
+            </a:r>
+            <a:r>
+              <a:rPr lang="en-US" sz="2200" b="1" dirty="0">
+                <a:effectLst/>
+                <a:latin typeface="Calibri" panose="020F0502020204030204" pitchFamily="34" charset="0"/>
+                <a:ea typeface="Calibri" panose="020F0502020204030204" pitchFamily="34" charset="0"/>
+                <a:cs typeface="Times New Roman" panose="02020603050405020304" pitchFamily="18" charset="0"/>
+              </a:rPr>
+              <a:t>1.19</a:t>
+            </a:r>
+            <a:r>
+              <a:rPr lang="en-US" sz="2200" dirty="0">
+                <a:effectLst/>
+                <a:latin typeface="Calibri" panose="020F0502020204030204" pitchFamily="34" charset="0"/>
+                <a:ea typeface="Calibri" panose="020F0502020204030204" pitchFamily="34" charset="0"/>
+                <a:cs typeface="Times New Roman" panose="02020603050405020304" pitchFamily="18" charset="0"/>
+              </a:rPr>
+              <a:t>. </a:t>
+            </a:r>
+            <a:endParaRPr lang="en-US" sz="2200" dirty="0">
+              <a:latin typeface="Calibri" panose="020F0502020204030204" pitchFamily="34" charset="0"/>
+              <a:ea typeface="Calibri" panose="020F0502020204030204" pitchFamily="34" charset="0"/>
+              <a:cs typeface="Times New Roman" panose="02020603050405020304" pitchFamily="18" charset="0"/>
+            </a:endParaRPr>
+          </a:p>
+          <a:p>
+            <a:pPr>
+              <a:lnSpc>
+                <a:spcPct val="107000"/>
+              </a:lnSpc>
+              <a:spcBef>
+                <a:spcPts val="0"/>
+              </a:spcBef>
+              <a:spcAft>
+                <a:spcPts val="800"/>
+              </a:spcAft>
+            </a:pPr>
+            <a:r>
+              <a:rPr lang="en-US" sz="2200" dirty="0">
+                <a:effectLst/>
+                <a:latin typeface="Calibri" panose="020F0502020204030204" pitchFamily="34" charset="0"/>
+                <a:ea typeface="Calibri" panose="020F0502020204030204" pitchFamily="34" charset="0"/>
+                <a:cs typeface="Times New Roman" panose="02020603050405020304" pitchFamily="18" charset="0"/>
+              </a:rPr>
+              <a:t>Bitcoin google searches has the biggest impact out of all the independent variables. </a:t>
+            </a:r>
+          </a:p>
+          <a:p>
+            <a:endParaRPr lang="en-US" sz="2000" dirty="0"/>
+          </a:p>
+        </p:txBody>
+      </p:sp>
+      <p:pic>
+        <p:nvPicPr>
+          <p:cNvPr id="9" name="Picture 8" descr="Chart&#10;&#10;Description automatically generated">
+            <a:extLst>
+              <a:ext uri="{FF2B5EF4-FFF2-40B4-BE49-F238E27FC236}">
+                <a16:creationId xmlns:a16="http://schemas.microsoft.com/office/drawing/2014/main" id="{EE4C38BC-1EB0-44E5-AA4C-EE0EBC9BAC31}"/>
+              </a:ext>
+            </a:extLst>
+          </p:cNvPr>
+          <p:cNvPicPr/>
+          <p:nvPr/>
+        </p:nvPicPr>
+        <p:blipFill>
+          <a:blip r:embed="rId2">
+            <a:extLst>
+              <a:ext uri="{28A0092B-C50C-407E-A947-70E740481C1C}">
+                <a14:useLocalDpi xmlns:a14="http://schemas.microsoft.com/office/drawing/2010/main" val="0"/>
+              </a:ext>
+            </a:extLst>
+          </a:blip>
+          <a:srcRect/>
+          <a:stretch>
+            <a:fillRect/>
+          </a:stretch>
+        </p:blipFill>
+        <p:spPr bwMode="auto">
+          <a:xfrm>
+            <a:off x="5795158" y="1891969"/>
+            <a:ext cx="6163294" cy="4200073"/>
+          </a:xfrm>
+          <a:prstGeom prst="rect">
+            <a:avLst/>
+          </a:prstGeom>
+          <a:noFill/>
+          <a:ln>
+            <a:noFill/>
+          </a:ln>
+        </p:spPr>
+      </p:pic>
+    </p:spTree>
+    <p:extLst>
+      <p:ext uri="{BB962C8B-B14F-4D97-AF65-F5344CB8AC3E}">
+        <p14:creationId xmlns:p14="http://schemas.microsoft.com/office/powerpoint/2010/main" val="2783444231"/>
+      </p:ext>
+    </p:extLst>
+  </p:cSld>
+  <p:clrMapOvr>
+    <a:masterClrMapping/>
+  </p:clrMapOvr>
+</p:sld>
+</file>
+
+<file path=ppt/slides/slide12.xml><?xml version="1.0" encoding="utf-8"?>
+<p:sld xmlns:a="http://schemas.openxmlformats.org/drawingml/2006/main" xmlns:r="http://schemas.openxmlformats.org/officeDocument/2006/relationships" xmlns:p="http://schemas.openxmlformats.org/presentationml/2006/main">
+  <p:cSld>
+    <p:bg>
+      <p:bgPr>
+        <a:solidFill>
+          <a:schemeClr val="bg1"/>
+        </a:solidFill>
+        <a:effectLst/>
+      </p:bgPr>
+    </p:bg>
+    <p:spTree>
+      <p:nvGrpSpPr>
+        <p:cNvPr id="1" name=""/>
+        <p:cNvGrpSpPr/>
+        <p:nvPr/>
+      </p:nvGrpSpPr>
+      <p:grpSpPr>
+        <a:xfrm>
+          <a:off x="0" y="0"/>
+          <a:ext cx="0" cy="0"/>
+          <a:chOff x="0" y="0"/>
+          <a:chExt cx="0" cy="0"/>
+        </a:xfrm>
+      </p:grpSpPr>
+      <p:sp useBgFill="1">
+        <p:nvSpPr>
+          <p:cNvPr id="23" name="Rectangle 22">
+            <a:extLst>
+              <a:ext uri="{FF2B5EF4-FFF2-40B4-BE49-F238E27FC236}">
+                <a16:creationId xmlns:a16="http://schemas.microsoft.com/office/drawing/2014/main" id="{1B15ED52-F352-441B-82BF-E0EA34836D08}"/>
+              </a:ext>
+              <a:ext uri="{C183D7F6-B498-43B3-948B-1728B52AA6E4}">
+                <adec:decorative xmlns:adec="http://schemas.microsoft.com/office/drawing/2017/decorative" val="1"/>
+              </a:ext>
+            </a:extLst>
+          </p:cNvPr>
+          <p:cNvSpPr>
+            <a:spLocks noGrp="1" noRot="1" noChangeAspect="1" noMove="1" noResize="1" noEditPoints="1" noAdjustHandles="1" noChangeArrowheads="1" noChangeShapeType="1" noTextEdit="1"/>
+          </p:cNvSpPr>
+          <p:nvPr>
+            <p:extLst>
+              <p:ext uri="{386F3935-93C4-4BCD-93E2-E3B085C9AB24}">
+                <p16:designElem xmlns:p16="http://schemas.microsoft.com/office/powerpoint/2015/main" val="1"/>
+              </p:ext>
+            </p:extLst>
+          </p:nvPr>
+        </p:nvSpPr>
+        <p:spPr>
+          <a:xfrm>
+            <a:off x="0" y="0"/>
+            <a:ext cx="12192000" cy="6858000"/>
+          </a:xfrm>
+          <a:prstGeom prst="rect">
+            <a:avLst/>
+          </a:prstGeom>
+          <a:ln w="12700" cap="flat" cmpd="sng" algn="ctr">
+            <a:noFill/>
+            <a:prstDash val="solid"/>
+            <a:miter lim="800000"/>
+          </a:ln>
+          <a:effectLst/>
+          <a:extLst>
+            <a:ext uri="{91240B29-F687-4F45-9708-019B960494DF}">
+              <a14:hiddenLine xmlns:a14="http://schemas.microsoft.com/office/drawing/2010/main" w="12700" cap="flat" cmpd="sng" algn="ctr">
+                <a:solidFill>
+                  <a:schemeClr val="accent1">
+                    <a:shade val="50000"/>
+                  </a:schemeClr>
+                </a:solidFill>
+                <a:prstDash val="solid"/>
+                <a:miter lim="800000"/>
+              </a14:hiddenLine>
+            </a:ext>
+          </a:extLst>
+        </p:spPr>
+        <p:style>
+          <a:lnRef idx="2">
+            <a:schemeClr val="accent1">
+              <a:shade val="50000"/>
+            </a:schemeClr>
+          </a:lnRef>
+          <a:fillRef idx="1">
+            <a:schemeClr val="accent1"/>
+          </a:fillRef>
+          <a:effectRef idx="0">
+            <a:schemeClr val="accent1"/>
+          </a:effectRef>
+          <a:fontRef idx="minor">
+            <a:schemeClr val="lt1"/>
+          </a:fontRef>
+        </p:style>
+        <p:txBody>
+          <a:bodyPr rtlCol="0" anchor="ctr"/>
+          <a:lstStyle/>
+          <a:p>
+            <a:pPr algn="ctr"/>
+            <a:endParaRPr lang="en-US"/>
+          </a:p>
+        </p:txBody>
+      </p:sp>
+      <p:sp>
+        <p:nvSpPr>
+          <p:cNvPr id="25" name="Rectangle 24">
+            <a:extLst>
+              <a:ext uri="{FF2B5EF4-FFF2-40B4-BE49-F238E27FC236}">
+                <a16:creationId xmlns:a16="http://schemas.microsoft.com/office/drawing/2014/main" id="{3B2E3793-BFE6-45A2-9B7B-E18844431C99}"/>
+              </a:ext>
+              <a:ext uri="{C183D7F6-B498-43B3-948B-1728B52AA6E4}">
+                <adec:decorative xmlns:adec="http://schemas.microsoft.com/office/drawing/2017/decorative" val="1"/>
+              </a:ext>
+            </a:extLst>
+          </p:cNvPr>
+          <p:cNvSpPr>
+            <a:spLocks noGrp="1" noRot="1" noChangeAspect="1" noMove="1" noResize="1" noEditPoints="1" noAdjustHandles="1" noChangeArrowheads="1" noChangeShapeType="1" noTextEdit="1"/>
+          </p:cNvSpPr>
+          <p:nvPr>
+            <p:extLst>
+              <p:ext uri="{386F3935-93C4-4BCD-93E2-E3B085C9AB24}">
+                <p16:designElem xmlns:p16="http://schemas.microsoft.com/office/powerpoint/2015/main" val="1"/>
+              </p:ext>
+            </p:extLst>
+          </p:nvPr>
+        </p:nvSpPr>
+        <p:spPr>
+          <a:xfrm flipH="1">
+            <a:off x="-1" y="-1"/>
+            <a:ext cx="12191998" cy="1590742"/>
+          </a:xfrm>
+          <a:prstGeom prst="rect">
+            <a:avLst/>
+          </a:prstGeom>
+          <a:gradFill>
+            <a:gsLst>
+              <a:gs pos="0">
+                <a:srgbClr val="000000"/>
+              </a:gs>
+              <a:gs pos="100000">
+                <a:schemeClr val="accent1">
+                  <a:lumMod val="75000"/>
+                </a:schemeClr>
+              </a:gs>
+            </a:gsLst>
+            <a:lin ang="8400000" scaled="0"/>
+          </a:gradFill>
+          <a:ln>
+            <a:noFill/>
+          </a:ln>
+        </p:spPr>
+        <p:style>
+          <a:lnRef idx="2">
+            <a:schemeClr val="accent1">
+              <a:shade val="50000"/>
+            </a:schemeClr>
+          </a:lnRef>
+          <a:fillRef idx="1">
+            <a:schemeClr val="accent1"/>
+          </a:fillRef>
+          <a:effectRef idx="0">
+            <a:schemeClr val="accent1"/>
+          </a:effectRef>
+          <a:fontRef idx="minor">
+            <a:schemeClr val="lt1"/>
+          </a:fontRef>
+        </p:style>
+        <p:txBody>
+          <a:bodyPr rtlCol="0" anchor="ctr"/>
+          <a:lstStyle/>
+          <a:p>
+            <a:pPr algn="ctr"/>
+            <a:endParaRPr lang="en-US"/>
+          </a:p>
+        </p:txBody>
+      </p:sp>
+      <p:sp>
+        <p:nvSpPr>
+          <p:cNvPr id="27" name="Rectangle 26">
+            <a:extLst>
+              <a:ext uri="{FF2B5EF4-FFF2-40B4-BE49-F238E27FC236}">
+                <a16:creationId xmlns:a16="http://schemas.microsoft.com/office/drawing/2014/main" id="{BC4C4868-CB8F-4AF9-9CDB-8108F2C19B67}"/>
+              </a:ext>
+              <a:ext uri="{C183D7F6-B498-43B3-948B-1728B52AA6E4}">
+                <adec:decorative xmlns:adec="http://schemas.microsoft.com/office/drawing/2017/decorative" val="1"/>
+              </a:ext>
+            </a:extLst>
+          </p:cNvPr>
+          <p:cNvSpPr>
+            <a:spLocks noGrp="1" noRot="1" noChangeAspect="1" noMove="1" noResize="1" noEditPoints="1" noAdjustHandles="1" noChangeArrowheads="1" noChangeShapeType="1" noTextEdit="1"/>
+          </p:cNvSpPr>
+          <p:nvPr>
+            <p:extLst>
+              <p:ext uri="{386F3935-93C4-4BCD-93E2-E3B085C9AB24}">
+                <p16:designElem xmlns:p16="http://schemas.microsoft.com/office/powerpoint/2015/main" val="1"/>
+              </p:ext>
+            </p:extLst>
+          </p:nvPr>
+        </p:nvSpPr>
+        <p:spPr>
+          <a:xfrm rot="10800000" flipH="1">
+            <a:off x="-3" y="0"/>
+            <a:ext cx="8115306" cy="1590742"/>
+          </a:xfrm>
+          <a:prstGeom prst="rect">
+            <a:avLst/>
+          </a:prstGeom>
+          <a:gradFill>
+            <a:gsLst>
+              <a:gs pos="20000">
+                <a:schemeClr val="accent1">
+                  <a:alpha val="0"/>
+                </a:schemeClr>
+              </a:gs>
+              <a:gs pos="100000">
+                <a:schemeClr val="accent1">
+                  <a:lumMod val="50000"/>
+                  <a:alpha val="55000"/>
+                </a:schemeClr>
+              </a:gs>
+            </a:gsLst>
+            <a:lin ang="13800000" scaled="0"/>
+          </a:gradFill>
+          <a:ln>
+            <a:noFill/>
+          </a:ln>
+        </p:spPr>
+        <p:style>
+          <a:lnRef idx="2">
+            <a:schemeClr val="accent1">
+              <a:shade val="50000"/>
+            </a:schemeClr>
+          </a:lnRef>
+          <a:fillRef idx="1">
+            <a:schemeClr val="accent1"/>
+          </a:fillRef>
+          <a:effectRef idx="0">
+            <a:schemeClr val="accent1"/>
+          </a:effectRef>
+          <a:fontRef idx="minor">
+            <a:schemeClr val="lt1"/>
+          </a:fontRef>
+        </p:style>
+        <p:txBody>
+          <a:bodyPr rtlCol="0" anchor="ctr"/>
+          <a:lstStyle/>
+          <a:p>
+            <a:pPr algn="ctr"/>
+            <a:endParaRPr lang="en-US"/>
+          </a:p>
+        </p:txBody>
+      </p:sp>
+      <p:sp>
+        <p:nvSpPr>
+          <p:cNvPr id="29" name="Rectangle 28">
+            <a:extLst>
+              <a:ext uri="{FF2B5EF4-FFF2-40B4-BE49-F238E27FC236}">
+                <a16:creationId xmlns:a16="http://schemas.microsoft.com/office/drawing/2014/main" id="{375E0459-6403-40CD-989D-56A4407CA12E}"/>
+              </a:ext>
+              <a:ext uri="{C183D7F6-B498-43B3-948B-1728B52AA6E4}">
+                <adec:decorative xmlns:adec="http://schemas.microsoft.com/office/drawing/2017/decorative" val="1"/>
+              </a:ext>
+            </a:extLst>
+          </p:cNvPr>
+          <p:cNvSpPr>
+            <a:spLocks noGrp="1" noRot="1" noChangeAspect="1" noMove="1" noResize="1" noEditPoints="1" noAdjustHandles="1" noChangeArrowheads="1" noChangeShapeType="1" noTextEdit="1"/>
+          </p:cNvSpPr>
+          <p:nvPr>
+            <p:extLst>
+              <p:ext uri="{386F3935-93C4-4BCD-93E2-E3B085C9AB24}">
+                <p16:designElem xmlns:p16="http://schemas.microsoft.com/office/powerpoint/2015/main" val="1"/>
+              </p:ext>
+            </p:extLst>
+          </p:nvPr>
+        </p:nvSpPr>
+        <p:spPr>
+          <a:xfrm flipH="1">
+            <a:off x="8115299" y="-1"/>
+            <a:ext cx="4076698" cy="1590742"/>
+          </a:xfrm>
+          <a:prstGeom prst="rect">
+            <a:avLst/>
+          </a:prstGeom>
+          <a:gradFill>
+            <a:gsLst>
+              <a:gs pos="0">
+                <a:schemeClr val="accent1">
+                  <a:alpha val="66000"/>
+                </a:schemeClr>
+              </a:gs>
+              <a:gs pos="100000">
+                <a:srgbClr val="000000">
+                  <a:alpha val="30000"/>
+                </a:srgbClr>
+              </a:gs>
+            </a:gsLst>
+            <a:lin ang="13200000" scaled="0"/>
+          </a:gradFill>
+          <a:ln>
+            <a:noFill/>
+          </a:ln>
+        </p:spPr>
+        <p:style>
+          <a:lnRef idx="2">
+            <a:schemeClr val="accent1">
+              <a:shade val="50000"/>
+            </a:schemeClr>
+          </a:lnRef>
+          <a:fillRef idx="1">
+            <a:schemeClr val="accent1"/>
+          </a:fillRef>
+          <a:effectRef idx="0">
+            <a:schemeClr val="accent1"/>
+          </a:effectRef>
+          <a:fontRef idx="minor">
+            <a:schemeClr val="lt1"/>
+          </a:fontRef>
+        </p:style>
+        <p:txBody>
+          <a:bodyPr rtlCol="0" anchor="ctr"/>
+          <a:lstStyle/>
+          <a:p>
+            <a:pPr algn="ctr"/>
+            <a:endParaRPr lang="en-US"/>
+          </a:p>
+        </p:txBody>
+      </p:sp>
+      <p:sp>
+        <p:nvSpPr>
+          <p:cNvPr id="31" name="Rectangle 30">
+            <a:extLst>
+              <a:ext uri="{FF2B5EF4-FFF2-40B4-BE49-F238E27FC236}">
+                <a16:creationId xmlns:a16="http://schemas.microsoft.com/office/drawing/2014/main" id="{53E5B1A8-3AC9-4BD1-9BBC-78CA94F2D1BA}"/>
+              </a:ext>
+              <a:ext uri="{C183D7F6-B498-43B3-948B-1728B52AA6E4}">
+                <adec:decorative xmlns:adec="http://schemas.microsoft.com/office/drawing/2017/decorative" val="1"/>
+              </a:ext>
+            </a:extLst>
+          </p:cNvPr>
+          <p:cNvSpPr>
+            <a:spLocks noGrp="1" noRot="1" noChangeAspect="1" noMove="1" noResize="1" noEditPoints="1" noAdjustHandles="1" noChangeArrowheads="1" noChangeShapeType="1" noTextEdit="1"/>
+          </p:cNvSpPr>
+          <p:nvPr>
+            <p:extLst>
+              <p:ext uri="{386F3935-93C4-4BCD-93E2-E3B085C9AB24}">
+                <p16:designElem xmlns:p16="http://schemas.microsoft.com/office/powerpoint/2015/main" val="1"/>
+              </p:ext>
+            </p:extLst>
+          </p:nvPr>
+        </p:nvSpPr>
+        <p:spPr>
+          <a:xfrm>
+            <a:off x="459350" y="-1"/>
+            <a:ext cx="11732646" cy="1597433"/>
+          </a:xfrm>
+          <a:prstGeom prst="rect">
+            <a:avLst/>
+          </a:prstGeom>
+          <a:gradFill>
+            <a:gsLst>
+              <a:gs pos="50000">
+                <a:srgbClr val="000000">
+                  <a:alpha val="0"/>
+                </a:srgbClr>
+              </a:gs>
+              <a:gs pos="99000">
+                <a:schemeClr val="accent1">
+                  <a:lumMod val="50000"/>
+                  <a:alpha val="52000"/>
+                </a:schemeClr>
+              </a:gs>
+            </a:gsLst>
+            <a:lin ang="16800000" scaled="0"/>
+          </a:gradFill>
+          <a:ln>
+            <a:noFill/>
+          </a:ln>
+        </p:spPr>
+        <p:style>
+          <a:lnRef idx="2">
+            <a:schemeClr val="accent1">
+              <a:shade val="50000"/>
+            </a:schemeClr>
+          </a:lnRef>
+          <a:fillRef idx="1">
+            <a:schemeClr val="accent1"/>
+          </a:fillRef>
+          <a:effectRef idx="0">
+            <a:schemeClr val="accent1"/>
+          </a:effectRef>
+          <a:fontRef idx="minor">
+            <a:schemeClr val="lt1"/>
+          </a:fontRef>
+        </p:style>
+        <p:txBody>
+          <a:bodyPr rtlCol="0" anchor="ctr"/>
+          <a:lstStyle/>
+          <a:p>
+            <a:pPr algn="ctr"/>
+            <a:endParaRPr lang="en-US"/>
+          </a:p>
+        </p:txBody>
+      </p:sp>
+      <p:sp>
+        <p:nvSpPr>
+          <p:cNvPr id="2" name="Title 1">
+            <a:extLst>
+              <a:ext uri="{FF2B5EF4-FFF2-40B4-BE49-F238E27FC236}">
+                <a16:creationId xmlns:a16="http://schemas.microsoft.com/office/drawing/2014/main" id="{9CF1690A-819C-4D0B-8225-5F7A0893DC1A}"/>
+              </a:ext>
+            </a:extLst>
+          </p:cNvPr>
+          <p:cNvSpPr>
+            <a:spLocks noGrp="1"/>
+          </p:cNvSpPr>
+          <p:nvPr>
+            <p:ph type="title"/>
+          </p:nvPr>
+        </p:nvSpPr>
+        <p:spPr>
+          <a:xfrm>
+            <a:off x="1371599" y="294538"/>
+            <a:ext cx="9895951" cy="1033669"/>
+          </a:xfrm>
+        </p:spPr>
+        <p:txBody>
+          <a:bodyPr>
+            <a:normAutofit/>
+          </a:bodyPr>
+          <a:lstStyle/>
+          <a:p>
+            <a:r>
+              <a:rPr lang="en-US" sz="4000" b="1" dirty="0">
+                <a:solidFill>
+                  <a:srgbClr val="FFFFFF"/>
+                </a:solidFill>
+              </a:rPr>
               <a:t>Recommendations </a:t>
             </a:r>
           </a:p>
@@ -5052,7 +5675,7 @@
 </p:sld>
 </file>
 
-<file path=ppt/slides/slide12.xml><?xml version="1.0" encoding="utf-8"?>
+<file path=ppt/slides/slide13.xml><?xml version="1.0" encoding="utf-8"?>
 <p:sld xmlns:a="http://schemas.openxmlformats.org/drawingml/2006/main" xmlns:r="http://schemas.openxmlformats.org/officeDocument/2006/relationships" xmlns:p="http://schemas.openxmlformats.org/presentationml/2006/main">
   <p:cSld>
     <p:bg>
@@ -6691,7 +7314,7 @@
         </p:spPr>
         <p:txBody>
           <a:bodyPr anchor="ctr">
-            <a:normAutofit lnSpcReduction="10000"/>
+            <a:normAutofit/>
           </a:bodyPr>
           <a:lstStyle/>
           <a:p>
@@ -6771,19 +7394,18 @@
                 <a:ea typeface="Calibri" panose="020F0502020204030204" pitchFamily="34" charset="0"/>
                 <a:cs typeface="Times New Roman" panose="02020603050405020304" pitchFamily="18" charset="0"/>
               </a:rPr>
-              <a:t>Stocks included in our data: ['BTC-USD',  'ETH-USD',  'USDT-USD', 'BNB-USD',   'ADA-USD',  'DOGE-USD',  'XRP-USD',  'USDC-USD',   'DOT1-USD',  'HEX-USD',   'UNI3-USD',  'BCH-USD',  'LTC-USD’,  'SOL1-USD',  'LINK-USD',  'MATIC-USD',  'THETA-USD',   'XLM-USD',  'VET-USD',  'ETC-USD',  'TRX-USD',  'ICP1-USD',  'FIL-USD',  'XMR-USD',   'EOS-USD',  'AMP1-USD',  'AAVE-USD',  'SHIB-USD',  'ALGO-USD',  'CRO-USD’]</a:t>
-            </a:r>
-          </a:p>
-          <a:p>
-            <a:pPr marL="742950" marR="0" lvl="1" indent="-285750">
+              <a:t>Stocks included in our data: ['BTC-USD',  'ETH-USD', 'DOGE-USD',  'XRP-USD’]</a:t>
+            </a:r>
+          </a:p>
+          <a:p>
+            <a:pPr marL="457200" marR="0" lvl="1" indent="0">
               <a:spcBef>
                 <a:spcPts val="0"/>
               </a:spcBef>
               <a:spcAft>
                 <a:spcPts val="0"/>
               </a:spcAft>
-              <a:buFont typeface="Courier New" panose="02070309020205020404" pitchFamily="49" charset="0"/>
-              <a:buChar char="o"/>
+              <a:buNone/>
             </a:pPr>
             <a:endParaRPr lang="en-US" sz="2200" dirty="0">
               <a:effectLst/>
@@ -8438,6 +9060,9 @@
             <a:endParaRPr lang="en-US" sz="2200" dirty="0"/>
           </a:p>
           <a:p>
+            <a:endParaRPr lang="en-US" sz="2200" dirty="0"/>
+          </a:p>
+          <a:p>
             <a:r>
               <a:rPr lang="en-US" sz="2200" dirty="0"/>
               <a:t>Bitcoin dominates google search results. </a:t>
@@ -8466,12 +9091,6 @@
               <a:t> </a:t>
             </a:r>
             <a:endParaRPr lang="en-US" sz="2200" dirty="0"/>
-          </a:p>
-          <a:p>
-            <a:r>
-              <a:rPr lang="en-US" sz="2200" dirty="0"/>
-              <a:t>Overall structure of graph is similar to the stock closing price of CCi30</a:t>
-            </a:r>
           </a:p>
         </p:txBody>
       </p:sp>
@@ -8517,7 +9136,7 @@
     </p:spTree>
     <p:extLst>
       <p:ext uri="{BB962C8B-B14F-4D97-AF65-F5344CB8AC3E}">
-        <p14:creationId xmlns:p14="http://schemas.microsoft.com/office/powerpoint/2010/main" val="4224861659"/>
+        <p14:creationId xmlns:p14="http://schemas.microsoft.com/office/powerpoint/2010/main" val="3708589165"/>
       </p:ext>
     </p:extLst>
   </p:cSld>
@@ -8962,17 +9581,17 @@
                   <a:srgbClr val="FFFFFF"/>
                 </a:solidFill>
               </a:rPr>
-              <a:t>PCA Analysis</a:t>
-            </a:r>
-          </a:p>
-        </p:txBody>
-      </p:sp>
-      <p:sp>
-        <p:nvSpPr>
-          <p:cNvPr id="4" name="Content Placeholder 3">
-            <a:extLst>
-              <a:ext uri="{FF2B5EF4-FFF2-40B4-BE49-F238E27FC236}">
-                <a16:creationId xmlns:a16="http://schemas.microsoft.com/office/drawing/2014/main" id="{0B7D3D11-F59C-4ED6-B026-CCFA4ECDE639}"/>
+              <a:t>EDA</a:t>
+            </a:r>
+          </a:p>
+        </p:txBody>
+      </p:sp>
+      <p:sp>
+        <p:nvSpPr>
+          <p:cNvPr id="7" name="Content Placeholder 6">
+            <a:extLst>
+              <a:ext uri="{FF2B5EF4-FFF2-40B4-BE49-F238E27FC236}">
+                <a16:creationId xmlns:a16="http://schemas.microsoft.com/office/drawing/2014/main" id="{E7F461C1-6A4F-4007-A094-F631347E2400}"/>
               </a:ext>
             </a:extLst>
           </p:cNvPr>
@@ -8985,8 +9604,8 @@
         </p:nvSpPr>
         <p:spPr>
           <a:xfrm>
-            <a:off x="838200" y="1825625"/>
-            <a:ext cx="4472723" cy="4351338"/>
+            <a:off x="838200" y="1995055"/>
+            <a:ext cx="4585300" cy="4181908"/>
           </a:xfrm>
         </p:spPr>
         <p:txBody>
@@ -8996,46 +9615,58 @@
           <a:lstStyle/>
           <a:p>
             <a:r>
-              <a:rPr lang="en-US" sz="2200" dirty="0">
-                <a:effectLst/>
-                <a:latin typeface="Calibri" panose="020F0502020204030204" pitchFamily="34" charset="0"/>
-                <a:ea typeface="Calibri" panose="020F0502020204030204" pitchFamily="34" charset="0"/>
-                <a:cs typeface="Times New Roman" panose="02020603050405020304" pitchFamily="18" charset="0"/>
-              </a:rPr>
-              <a:t>PCA analysis on Yahoo Stock Prices to reduced the number of features from 30 down to 4 and decorrelated the features. </a:t>
-            </a:r>
-          </a:p>
-          <a:p>
-            <a:endParaRPr lang="en-US" sz="2200" dirty="0">
-              <a:latin typeface="Calibri" panose="020F0502020204030204" pitchFamily="34" charset="0"/>
-              <a:ea typeface="Calibri" panose="020F0502020204030204" pitchFamily="34" charset="0"/>
-              <a:cs typeface="Times New Roman" panose="02020603050405020304" pitchFamily="18" charset="0"/>
-            </a:endParaRPr>
-          </a:p>
-          <a:p>
-            <a:r>
-              <a:rPr lang="en-US" sz="2200" dirty="0">
-                <a:effectLst/>
-                <a:latin typeface="Calibri" panose="020F0502020204030204" pitchFamily="34" charset="0"/>
-                <a:ea typeface="Calibri" panose="020F0502020204030204" pitchFamily="34" charset="0"/>
-                <a:cs typeface="Times New Roman" panose="02020603050405020304" pitchFamily="18" charset="0"/>
-              </a:rPr>
-              <a:t>PCA analysis showed an optimal number of 4 components that explains 92% variance of the distribution. </a:t>
-            </a:r>
+              <a:rPr lang="en-US" sz="2200" dirty="0"/>
+              <a:t>Representation of the CCi30 index on Closing price and my estimation of the CCi30 index</a:t>
+            </a:r>
+          </a:p>
+          <a:p>
             <a:endParaRPr lang="en-US" sz="2200" dirty="0"/>
+          </a:p>
+          <a:p>
+            <a:r>
+              <a:rPr lang="en-US" sz="2200" dirty="0"/>
+              <a:t>The two graphs are extremely similar with </a:t>
+            </a:r>
+            <a:r>
+              <a:rPr lang="en-US" sz="2200"/>
+              <a:t>a huge </a:t>
+            </a:r>
+            <a:r>
+              <a:rPr lang="en-US" sz="2200" dirty="0"/>
+              <a:t>peak </a:t>
+            </a:r>
+            <a:r>
+              <a:rPr lang="en-US" sz="2200"/>
+              <a:t>in May </a:t>
+            </a:r>
+            <a:r>
+              <a:rPr lang="en-US" sz="2200" dirty="0"/>
+              <a:t>2021</a:t>
+            </a:r>
+          </a:p>
+          <a:p>
+            <a:endParaRPr lang="en-US" sz="2200" dirty="0"/>
+          </a:p>
+          <a:p>
+            <a:r>
+              <a:rPr lang="en-US" sz="2200" dirty="0"/>
+              <a:t>My PCA estimation is a good dataset to use for comparison with google trends</a:t>
+            </a:r>
           </a:p>
         </p:txBody>
       </p:sp>
       <p:pic>
         <p:nvPicPr>
-          <p:cNvPr id="13" name="Picture 12" descr="Shape&#10;&#10;Description automatically generated with medium confidence">
-            <a:extLst>
-              <a:ext uri="{FF2B5EF4-FFF2-40B4-BE49-F238E27FC236}">
-                <a16:creationId xmlns:a16="http://schemas.microsoft.com/office/drawing/2014/main" id="{04950764-6D96-48E1-9B20-4F5C4FD14E86}"/>
-              </a:ext>
-            </a:extLst>
-          </p:cNvPr>
-          <p:cNvPicPr/>
+          <p:cNvPr id="1026" name="Picture 2">
+            <a:extLst>
+              <a:ext uri="{FF2B5EF4-FFF2-40B4-BE49-F238E27FC236}">
+                <a16:creationId xmlns:a16="http://schemas.microsoft.com/office/drawing/2014/main" id="{8356BC23-9BD2-410D-906A-58F9DBD4A66F}"/>
+              </a:ext>
+            </a:extLst>
+          </p:cNvPr>
+          <p:cNvPicPr>
+            <a:picLocks noChangeAspect="1" noChangeArrowheads="1"/>
+          </p:cNvPicPr>
           <p:nvPr/>
         </p:nvPicPr>
         <p:blipFill>
@@ -9053,22 +9684,28 @@
         </p:blipFill>
         <p:spPr bwMode="auto">
           <a:xfrm>
-            <a:off x="6095998" y="1695450"/>
-            <a:ext cx="4997378" cy="4611688"/>
+            <a:off x="5980489" y="1622745"/>
+            <a:ext cx="5959559" cy="4940717"/>
           </a:xfrm>
           <a:prstGeom prst="rect">
             <a:avLst/>
           </a:prstGeom>
           <a:noFill/>
-          <a:ln>
-            <a:noFill/>
-          </a:ln>
+          <a:extLst>
+            <a:ext uri="{909E8E84-426E-40DD-AFC4-6F175D3DCCD1}">
+              <a14:hiddenFill xmlns:a14="http://schemas.microsoft.com/office/drawing/2010/main">
+                <a:solidFill>
+                  <a:srgbClr val="FFFFFF"/>
+                </a:solidFill>
+              </a14:hiddenFill>
+            </a:ext>
+          </a:extLst>
         </p:spPr>
       </p:pic>
     </p:spTree>
     <p:extLst>
       <p:ext uri="{BB962C8B-B14F-4D97-AF65-F5344CB8AC3E}">
-        <p14:creationId xmlns:p14="http://schemas.microsoft.com/office/powerpoint/2010/main" val="2015448570"/>
+        <p14:creationId xmlns:p14="http://schemas.microsoft.com/office/powerpoint/2010/main" val="4224861659"/>
       </p:ext>
     </p:extLst>
   </p:cSld>
@@ -9541,17 +10178,11 @@
           </a:xfrm>
         </p:spPr>
         <p:txBody>
-          <a:bodyPr/>
-          <a:lstStyle/>
-          <a:p>
-            <a:r>
-              <a:rPr lang="en-US" sz="2200" dirty="0">
-                <a:latin typeface="Calibri" panose="020F0502020204030204" pitchFamily="34" charset="0"/>
-                <a:ea typeface="Calibri" panose="020F0502020204030204" pitchFamily="34" charset="0"/>
-                <a:cs typeface="Times New Roman" panose="02020603050405020304" pitchFamily="18" charset="0"/>
-              </a:rPr>
-              <a:t>PCA as a visualization tool. I </a:t>
-            </a:r>
+          <a:bodyPr>
+            <a:normAutofit/>
+          </a:bodyPr>
+          <a:lstStyle/>
+          <a:p>
             <a:r>
               <a:rPr lang="en-US" sz="2200" dirty="0">
                 <a:effectLst/>
@@ -9559,7 +10190,7 @@
                 <a:ea typeface="Calibri" panose="020F0502020204030204" pitchFamily="34" charset="0"/>
                 <a:cs typeface="Times New Roman" panose="02020603050405020304" pitchFamily="18" charset="0"/>
               </a:rPr>
-              <a:t>took the row wise mean of the 4 PCA components and plotted it</a:t>
+              <a:t>PCA analysis on Yahoo Stock Prices to reduced the number of features from 30 down to 4 and decorrelated the features. </a:t>
             </a:r>
           </a:p>
           <a:p>
@@ -9577,20 +10208,18 @@
                 <a:ea typeface="Calibri" panose="020F0502020204030204" pitchFamily="34" charset="0"/>
                 <a:cs typeface="Times New Roman" panose="02020603050405020304" pitchFamily="18" charset="0"/>
               </a:rPr>
-              <a:t>The row wise mean shows the mean of the eigenvectors of the 4 principal components for each week of our sample. Eigenvectors explain which direction (either rise or fall) our stock prices will go in the mimicked “CCi30 index”. </a:t>
-            </a:r>
-          </a:p>
-          <a:p>
-            <a:endParaRPr lang="en-US" dirty="0"/>
+              <a:t>PCA analysis showed an optimal number of 4 components that explains 92% variance of the distribution. </a:t>
+            </a:r>
+            <a:endParaRPr lang="en-US" sz="2200" dirty="0"/>
           </a:p>
         </p:txBody>
       </p:sp>
       <p:pic>
         <p:nvPicPr>
-          <p:cNvPr id="11" name="Picture 10" descr="A picture containing chart&#10;&#10;Description automatically generated">
-            <a:extLst>
-              <a:ext uri="{FF2B5EF4-FFF2-40B4-BE49-F238E27FC236}">
-                <a16:creationId xmlns:a16="http://schemas.microsoft.com/office/drawing/2014/main" id="{FA603B46-56EB-4198-92B5-3ABBB44A1847}"/>
+          <p:cNvPr id="13" name="Picture 12" descr="Shape&#10;&#10;Description automatically generated with medium confidence">
+            <a:extLst>
+              <a:ext uri="{FF2B5EF4-FFF2-40B4-BE49-F238E27FC236}">
+                <a16:creationId xmlns:a16="http://schemas.microsoft.com/office/drawing/2014/main" id="{04950764-6D96-48E1-9B20-4F5C4FD14E86}"/>
               </a:ext>
             </a:extLst>
           </p:cNvPr>
@@ -9612,8 +10241,8 @@
         </p:blipFill>
         <p:spPr bwMode="auto">
           <a:xfrm>
-            <a:off x="5310923" y="1818934"/>
-            <a:ext cx="6042877" cy="4451237"/>
+            <a:off x="6095998" y="1695450"/>
+            <a:ext cx="4997378" cy="4611688"/>
           </a:xfrm>
           <a:prstGeom prst="rect">
             <a:avLst/>
@@ -9627,7 +10256,7 @@
     </p:spTree>
     <p:extLst>
       <p:ext uri="{BB962C8B-B14F-4D97-AF65-F5344CB8AC3E}">
-        <p14:creationId xmlns:p14="http://schemas.microsoft.com/office/powerpoint/2010/main" val="302829738"/>
+        <p14:creationId xmlns:p14="http://schemas.microsoft.com/office/powerpoint/2010/main" val="2015448570"/>
       </p:ext>
     </p:extLst>
   </p:cSld>
@@ -10072,17 +10701,17 @@
                   <a:srgbClr val="FFFFFF"/>
                 </a:solidFill>
               </a:rPr>
-              <a:t>Model</a:t>
-            </a:r>
-          </a:p>
-        </p:txBody>
-      </p:sp>
-      <p:sp>
-        <p:nvSpPr>
-          <p:cNvPr id="3" name="Content Placeholder 2">
-            <a:extLst>
-              <a:ext uri="{FF2B5EF4-FFF2-40B4-BE49-F238E27FC236}">
-                <a16:creationId xmlns:a16="http://schemas.microsoft.com/office/drawing/2014/main" id="{FAFF643D-4422-4871-812A-0AFFE03F5CAE}"/>
+              <a:t>PCA Analysis</a:t>
+            </a:r>
+          </a:p>
+        </p:txBody>
+      </p:sp>
+      <p:sp>
+        <p:nvSpPr>
+          <p:cNvPr id="4" name="Content Placeholder 3">
+            <a:extLst>
+              <a:ext uri="{FF2B5EF4-FFF2-40B4-BE49-F238E27FC236}">
+                <a16:creationId xmlns:a16="http://schemas.microsoft.com/office/drawing/2014/main" id="{0B7D3D11-F59C-4ED6-B026-CCFA4ECDE639}"/>
               </a:ext>
             </a:extLst>
           </p:cNvPr>
@@ -10095,32 +10724,65 @@
         </p:nvSpPr>
         <p:spPr>
           <a:xfrm>
-            <a:off x="1371599" y="1891970"/>
-            <a:ext cx="9724031" cy="4671491"/>
-          </a:xfrm>
-        </p:spPr>
-        <p:txBody>
-          <a:bodyPr anchor="ctr">
-            <a:normAutofit/>
-          </a:bodyPr>
-          <a:lstStyle/>
-          <a:p>
-            <a:endParaRPr lang="en-US" sz="2000" dirty="0"/>
+            <a:off x="838200" y="1825625"/>
+            <a:ext cx="4472723" cy="4351338"/>
+          </a:xfrm>
+        </p:spPr>
+        <p:txBody>
+          <a:bodyPr/>
+          <a:lstStyle/>
+          <a:p>
+            <a:r>
+              <a:rPr lang="en-US" sz="2200" dirty="0">
+                <a:latin typeface="Calibri" panose="020F0502020204030204" pitchFamily="34" charset="0"/>
+                <a:ea typeface="Calibri" panose="020F0502020204030204" pitchFamily="34" charset="0"/>
+                <a:cs typeface="Times New Roman" panose="02020603050405020304" pitchFamily="18" charset="0"/>
+              </a:rPr>
+              <a:t>PCA as a visualization tool. I </a:t>
+            </a:r>
+            <a:r>
+              <a:rPr lang="en-US" sz="2200" dirty="0">
+                <a:effectLst/>
+                <a:latin typeface="Calibri" panose="020F0502020204030204" pitchFamily="34" charset="0"/>
+                <a:ea typeface="Calibri" panose="020F0502020204030204" pitchFamily="34" charset="0"/>
+                <a:cs typeface="Times New Roman" panose="02020603050405020304" pitchFamily="18" charset="0"/>
+              </a:rPr>
+              <a:t>took the row wise mean of the 4 PCA components and plotted it</a:t>
+            </a:r>
+          </a:p>
+          <a:p>
+            <a:endParaRPr lang="en-US" sz="2200" dirty="0">
+              <a:latin typeface="Calibri" panose="020F0502020204030204" pitchFamily="34" charset="0"/>
+              <a:ea typeface="Calibri" panose="020F0502020204030204" pitchFamily="34" charset="0"/>
+              <a:cs typeface="Times New Roman" panose="02020603050405020304" pitchFamily="18" charset="0"/>
+            </a:endParaRPr>
+          </a:p>
+          <a:p>
+            <a:r>
+              <a:rPr lang="en-US" sz="2200" dirty="0">
+                <a:effectLst/>
+                <a:latin typeface="Calibri" panose="020F0502020204030204" pitchFamily="34" charset="0"/>
+                <a:ea typeface="Calibri" panose="020F0502020204030204" pitchFamily="34" charset="0"/>
+                <a:cs typeface="Times New Roman" panose="02020603050405020304" pitchFamily="18" charset="0"/>
+              </a:rPr>
+              <a:t>The row wise mean shows the mean of the eigenvectors of the 4 principal components for each week of our sample. Eigenvectors explain which direction (either rise or fall) our stock prices will go in the mimicked “CCi30 index”. </a:t>
+            </a:r>
+          </a:p>
+          <a:p>
+            <a:endParaRPr lang="en-US" dirty="0"/>
           </a:p>
         </p:txBody>
       </p:sp>
       <p:pic>
         <p:nvPicPr>
-          <p:cNvPr id="1026" name="Picture 2">
-            <a:extLst>
-              <a:ext uri="{FF2B5EF4-FFF2-40B4-BE49-F238E27FC236}">
-                <a16:creationId xmlns:a16="http://schemas.microsoft.com/office/drawing/2014/main" id="{1AFD1DF8-0A51-4E12-9755-030C1D89B2FB}"/>
-              </a:ext>
-            </a:extLst>
-          </p:cNvPr>
-          <p:cNvPicPr>
-            <a:picLocks noChangeAspect="1" noChangeArrowheads="1"/>
-          </p:cNvPicPr>
+          <p:cNvPr id="11" name="Picture 10" descr="A picture containing chart&#10;&#10;Description automatically generated">
+            <a:extLst>
+              <a:ext uri="{FF2B5EF4-FFF2-40B4-BE49-F238E27FC236}">
+                <a16:creationId xmlns:a16="http://schemas.microsoft.com/office/drawing/2014/main" id="{FA603B46-56EB-4198-92B5-3ABBB44A1847}"/>
+              </a:ext>
+            </a:extLst>
+          </p:cNvPr>
+          <p:cNvPicPr/>
           <p:nvPr/>
         </p:nvPicPr>
         <p:blipFill>
@@ -10138,75 +10800,22 @@
         </p:blipFill>
         <p:spPr bwMode="auto">
           <a:xfrm>
-            <a:off x="189269" y="1791286"/>
-            <a:ext cx="6044345" cy="4449833"/>
+            <a:off x="5310923" y="1818934"/>
+            <a:ext cx="6042877" cy="4451237"/>
           </a:xfrm>
           <a:prstGeom prst="rect">
             <a:avLst/>
           </a:prstGeom>
           <a:noFill/>
-          <a:extLst>
-            <a:ext uri="{909E8E84-426E-40DD-AFC4-6F175D3DCCD1}">
-              <a14:hiddenFill xmlns:a14="http://schemas.microsoft.com/office/drawing/2010/main">
-                <a:solidFill>
-                  <a:srgbClr val="FFFFFF"/>
-                </a:solidFill>
-              </a14:hiddenFill>
-            </a:ext>
-          </a:extLst>
-        </p:spPr>
-      </p:pic>
-      <p:pic>
-        <p:nvPicPr>
-          <p:cNvPr id="1028" name="Picture 4">
-            <a:extLst>
-              <a:ext uri="{FF2B5EF4-FFF2-40B4-BE49-F238E27FC236}">
-                <a16:creationId xmlns:a16="http://schemas.microsoft.com/office/drawing/2014/main" id="{3D2A3FB6-7837-4793-AA52-9087F6A3F2DA}"/>
-              </a:ext>
-            </a:extLst>
-          </p:cNvPr>
-          <p:cNvPicPr>
-            <a:picLocks noChangeAspect="1" noChangeArrowheads="1"/>
-          </p:cNvPicPr>
-          <p:nvPr/>
-        </p:nvPicPr>
-        <p:blipFill>
-          <a:blip r:embed="rId3">
-            <a:extLst>
-              <a:ext uri="{28A0092B-C50C-407E-A947-70E740481C1C}">
-                <a14:useLocalDpi xmlns:a14="http://schemas.microsoft.com/office/drawing/2010/main" val="0"/>
-              </a:ext>
-            </a:extLst>
-          </a:blip>
-          <a:srcRect/>
-          <a:stretch>
-            <a:fillRect/>
-          </a:stretch>
-        </p:blipFill>
-        <p:spPr bwMode="auto">
-          <a:xfrm>
-            <a:off x="6319574" y="1815102"/>
-            <a:ext cx="5777392" cy="4430640"/>
-          </a:xfrm>
-          <a:prstGeom prst="rect">
-            <a:avLst/>
-          </a:prstGeom>
-          <a:noFill/>
-          <a:extLst>
-            <a:ext uri="{909E8E84-426E-40DD-AFC4-6F175D3DCCD1}">
-              <a14:hiddenFill xmlns:a14="http://schemas.microsoft.com/office/drawing/2010/main">
-                <a:solidFill>
-                  <a:srgbClr val="FFFFFF"/>
-                </a:solidFill>
-              </a14:hiddenFill>
-            </a:ext>
-          </a:extLst>
+          <a:ln>
+            <a:noFill/>
+          </a:ln>
         </p:spPr>
       </p:pic>
     </p:spTree>
     <p:extLst>
       <p:ext uri="{BB962C8B-B14F-4D97-AF65-F5344CB8AC3E}">
-        <p14:creationId xmlns:p14="http://schemas.microsoft.com/office/powerpoint/2010/main" val="2362474329"/>
+        <p14:creationId xmlns:p14="http://schemas.microsoft.com/office/powerpoint/2010/main" val="302829738"/>
       </p:ext>
     </p:extLst>
   </p:cSld>

</xml_diff>